<commit_message>
Finalize rmd and presentation files.
</commit_message>
<xml_diff>
--- a/Presentation/DDSAnalytics_2.pptx
+++ b/Presentation/DDSAnalytics_2.pptx
@@ -6495,56 +6495,52 @@
           </a:p>
           <a:p>
             <a:pPr marL="800100" lvl="1" indent="-342900">
-              <a:buFont typeface="Wingdings" panose="05000000000000000000" pitchFamily="2" charset="2"/>
-              <a:buChar char="Ø"/>
+              <a:buFont typeface="Arial" panose="020B0604020202020204" pitchFamily="34" charset="0"/>
+              <a:buChar char="•"/>
             </a:pPr>
             <a:r>
-              <a:rPr lang="en-US" sz="2000" i="1" dirty="0"/>
-              <a:t>	</a:t>
-            </a:r>
-            <a:r>
               <a:rPr lang="en-US" sz="2000" dirty="0"/>
-              <a:t>𝐸𝑛𝑣𝑖𝑟𝑜𝑛𝑒𝑚𝑛𝑡 𝑆𝑎𝑡𝑖𝑠𝑓𝑎𝑐𝑡𝑖𝑜𝑛</a:t>
+              <a:t>	Environmental Satisfaction</a:t>
             </a:r>
           </a:p>
           <a:p>
             <a:pPr marL="800100" lvl="1" indent="-342900">
-              <a:buFont typeface="Wingdings" panose="05000000000000000000" pitchFamily="2" charset="2"/>
-              <a:buChar char="Ø"/>
+              <a:buFont typeface="Arial" panose="020B0604020202020204" pitchFamily="34" charset="0"/>
+              <a:buChar char="•"/>
             </a:pPr>
             <a:r>
               <a:rPr lang="en-US" sz="2000" dirty="0"/>
-              <a:t>	𝐽𝑜𝑏 𝑆𝑎𝑡𝑖𝑠𝑓𝑎𝑐𝑡𝑖𝑜𝑛 </a:t>
+              <a:t>	Job Satisfaction</a:t>
             </a:r>
           </a:p>
           <a:p>
             <a:pPr marL="800100" lvl="1" indent="-342900">
-              <a:buFont typeface="Wingdings" panose="05000000000000000000" pitchFamily="2" charset="2"/>
-              <a:buChar char="Ø"/>
+              <a:buFont typeface="Arial" panose="020B0604020202020204" pitchFamily="34" charset="0"/>
+              <a:buChar char="•"/>
             </a:pPr>
             <a:r>
               <a:rPr lang="en-US" sz="2000" dirty="0"/>
-              <a:t>	Relationship 𝑆𝑎𝑡𝑖𝑠faction </a:t>
+              <a:t>	Relationship Satisfaction</a:t>
             </a:r>
           </a:p>
           <a:p>
             <a:pPr marL="800100" lvl="1" indent="-342900">
-              <a:buFont typeface="Wingdings" panose="05000000000000000000" pitchFamily="2" charset="2"/>
-              <a:buChar char="Ø"/>
+              <a:buFont typeface="Arial" panose="020B0604020202020204" pitchFamily="34" charset="0"/>
+              <a:buChar char="•"/>
             </a:pPr>
             <a:r>
               <a:rPr lang="en-US" sz="2000" dirty="0"/>
-              <a:t>	Work life 𝐵𝑎𝑙𝑎𝑛𝑐𝑒</a:t>
+              <a:t>	Work life Balance</a:t>
             </a:r>
           </a:p>
           <a:p>
             <a:pPr marL="800100" lvl="1" indent="-342900">
-              <a:buFont typeface="Wingdings" panose="05000000000000000000" pitchFamily="2" charset="2"/>
-              <a:buChar char="Ø"/>
+              <a:buFont typeface="Arial" panose="020B0604020202020204" pitchFamily="34" charset="0"/>
+              <a:buChar char="•"/>
             </a:pPr>
             <a:r>
               <a:rPr lang="en-US" sz="2000" dirty="0"/>
-              <a:t>	𝐽𝑜𝑏 Involvement</a:t>
+              <a:t>	Job Involvement</a:t>
             </a:r>
           </a:p>
           <a:p>

</xml_diff>

<commit_message>
Final Formatting of Presentation
</commit_message>
<xml_diff>
--- a/Presentation/DDSAnalytics_2.pptx
+++ b/Presentation/DDSAnalytics_2.pptx
@@ -16960,7 +16960,19 @@
               <a:rPr lang="en-US" dirty="0">
                 <a:latin typeface="+mj-lt"/>
               </a:rPr>
-              <a:t>𝐿𝑖𝑓𝑒 𝑆𝑎𝑡𝑖𝑠𝑓𝑎𝑐𝑡𝑖𝑜𝑛 𝑖𝑠 𝑎𝑣𝑒𝑟𝑎𝑔𝑒 𝑜𝑓 𝐸𝑛𝑣𝑖𝑟𝑜𝑛𝑒𝑚𝑛𝑡 𝑆𝑎𝑡𝑖𝑠𝑓𝑎𝑐𝑡𝑖𝑜𝑛,𝐽𝑜𝑏 𝑆𝑎𝑡𝑖𝑠𝑓𝑎𝑐𝑡𝑖𝑜𝑛, Relationship 𝑆𝑎𝑡𝑖𝑠faction, Work life 𝐵𝑎𝑙𝑎𝑛𝑐𝑒,𝐽𝑜𝑏 𝐼𝑛𝑣𝑜𝑙𝑣𝑒𝑚𝑡)</a:t>
+              <a:t>Life Satisfaction is average of Environmental Satisfaction, Job Satisfaction, Relationship Satisfaction, Work Life Balance and Job </a:t>
+            </a:r>
+            <a:r>
+              <a:rPr lang="en-US" dirty="0" err="1">
+                <a:latin typeface="+mj-lt"/>
+              </a:rPr>
+              <a:t>Involvment</a:t>
+            </a:r>
+            <a:r>
+              <a:rPr lang="en-US" dirty="0">
+                <a:latin typeface="+mj-lt"/>
+              </a:rPr>
+              <a:t>.</a:t>
             </a:r>
           </a:p>
         </p:txBody>

</xml_diff>